<commit_message>
updated class diagram in the ppt
</commit_message>
<xml_diff>
--- a/Deliverbles/Iteration1/Iteration1.pptx
+++ b/Deliverbles/Iteration1/Iteration1.pptx
@@ -113,7 +113,7 @@
   </p:defaultTextStyle>
   <p:extLst>
     <p:ext uri="{EFAFB233-063F-42B5-8137-9DF3F51BA10A}">
-      <p15:sldGuideLst xmlns:p15="http://schemas.microsoft.com/office/powerpoint/2012/main" xmlns="">
+      <p15:sldGuideLst xmlns="" xmlns:p15="http://schemas.microsoft.com/office/powerpoint/2012/main">
         <p15:guide id="1" orient="horz" pos="2160">
           <p15:clr>
             <a:srgbClr val="A4A3A4"/>
@@ -14704,34 +14704,64 @@
       </p:sp>
       <p:pic>
         <p:nvPicPr>
-          <p:cNvPr id="4" name="officeArt object"/>
-          <p:cNvPicPr/>
+          <p:cNvPr id="1027" name="Picture 3"/>
+          <p:cNvPicPr>
+            <a:picLocks noChangeAspect="1" noChangeArrowheads="1"/>
+          </p:cNvPicPr>
           <p:nvPr/>
         </p:nvPicPr>
         <p:blipFill>
           <a:blip r:embed="rId2">
-            <a:extLst/>
+            <a:extLst>
+              <a:ext uri="{28A0092B-C50C-407E-A947-70E740481C1C}">
+                <a14:useLocalDpi xmlns:a14="http://schemas.microsoft.com/office/drawing/2010/main" val="0"/>
+              </a:ext>
+            </a:extLst>
           </a:blip>
+          <a:srcRect/>
           <a:stretch>
             <a:fillRect/>
           </a:stretch>
         </p:blipFill>
-        <p:spPr>
+        <p:spPr bwMode="auto">
           <a:xfrm>
-            <a:off x="1752600" y="2533650"/>
-            <a:ext cx="5934075" cy="3257550"/>
+            <a:off x="1219200" y="2438400"/>
+            <a:ext cx="6553200" cy="3505200"/>
           </a:xfrm>
           <a:prstGeom prst="rect">
             <a:avLst/>
           </a:prstGeom>
-          <a:ln w="228600" cap="sq">
+          <a:ln w="228600" cap="sq" cmpd="thickThin">
             <a:solidFill>
               <a:srgbClr val="000000"/>
             </a:solidFill>
             <a:prstDash val="solid"/>
             <a:miter lim="800000"/>
           </a:ln>
-          <a:effectLst/>
+          <a:effectLst>
+            <a:innerShdw blurRad="76200">
+              <a:srgbClr val="000000"/>
+            </a:innerShdw>
+          </a:effectLst>
+          <a:extLst>
+            <a:ext uri="{909E8E84-426E-40DD-AFC4-6F175D3DCCD1}">
+              <a14:hiddenFill xmlns:a14="http://schemas.microsoft.com/office/drawing/2010/main">
+                <a:solidFill>
+                  <a:schemeClr val="accent1"/>
+                </a:solidFill>
+              </a14:hiddenFill>
+            </a:ext>
+            <a:ext uri="{91240B29-F687-4F45-9708-019B960494DF}">
+              <a14:hiddenLine xmlns:a14="http://schemas.microsoft.com/office/drawing/2010/main" w="9525">
+                <a:solidFill>
+                  <a:schemeClr val="tx1"/>
+                </a:solidFill>
+                <a:miter lim="800000"/>
+                <a:headEnd/>
+                <a:tailEnd/>
+              </a14:hiddenLine>
+            </a:ext>
+          </a:extLst>
         </p:spPr>
       </p:pic>
     </p:spTree>

</xml_diff>